<commit_message>
Ethan - 29/03/23 - Remade refund page, Column headers not showing, unsure why
</commit_message>
<xml_diff>
--- a/GUI Design.pptx
+++ b/GUI Design.pptx
@@ -125,7 +125,8 @@
 <file path=ppt/revisionInfo.xml><?xml version="1.0" encoding="utf-8"?>
 <p1510:revInfo xmlns:a="http://schemas.openxmlformats.org/drawingml/2006/main" xmlns:r="http://schemas.openxmlformats.org/officeDocument/2006/relationships" xmlns:p1510="http://schemas.microsoft.com/office/powerpoint/2015/10/main">
   <p1510:revLst>
-    <p1510:client id="{FC720EA1-E663-7E45-A0A6-02B0B15FC70F}" v="343" dt="2023-03-03T22:30:37.193"/>
+    <p1510:client id="{46B8D05E-234E-E941-BB8B-DC15B4B66215}" v="4" dt="2023-03-29T19:19:56.687"/>
+    <p1510:client id="{BED5191A-B82A-2C4D-A99D-5A69586E84A1}" v="1" dt="2023-03-29T14:11:45.591"/>
   </p1510:revLst>
 </p1510:revInfo>
 </file>
@@ -1743,6 +1744,85 @@
             <ac:graphicFrameMk id="4" creationId="{7EEA3A87-1236-2644-BC53-5AE6959D1AA3}"/>
           </ac:graphicFrameMkLst>
         </pc:graphicFrameChg>
+      </pc:sldChg>
+    </pc:docChg>
+  </pc:docChgLst>
+  <pc:docChgLst>
+    <pc:chgData name="UG-Sturua, Rati" userId="9a5f4678-9511-4e7d-ac16-bb075a284ffe" providerId="ADAL" clId="{BED5191A-B82A-2C4D-A99D-5A69586E84A1}"/>
+    <pc:docChg chg="undo custSel modSld">
+      <pc:chgData name="UG-Sturua, Rati" userId="9a5f4678-9511-4e7d-ac16-bb075a284ffe" providerId="ADAL" clId="{BED5191A-B82A-2C4D-A99D-5A69586E84A1}" dt="2023-03-29T14:11:45.589" v="7" actId="571"/>
+      <pc:docMkLst>
+        <pc:docMk/>
+      </pc:docMkLst>
+      <pc:sldChg chg="addSp delSp modSp mod">
+        <pc:chgData name="UG-Sturua, Rati" userId="9a5f4678-9511-4e7d-ac16-bb075a284ffe" providerId="ADAL" clId="{BED5191A-B82A-2C4D-A99D-5A69586E84A1}" dt="2023-03-29T14:11:45.589" v="7" actId="571"/>
+        <pc:sldMkLst>
+          <pc:docMk/>
+          <pc:sldMk cId="623594791" sldId="259"/>
+        </pc:sldMkLst>
+        <pc:picChg chg="add mod">
+          <ac:chgData name="UG-Sturua, Rati" userId="9a5f4678-9511-4e7d-ac16-bb075a284ffe" providerId="ADAL" clId="{BED5191A-B82A-2C4D-A99D-5A69586E84A1}" dt="2023-03-29T14:11:45.589" v="7" actId="571"/>
+          <ac:picMkLst>
+            <pc:docMk/>
+            <pc:sldMk cId="623594791" sldId="259"/>
+            <ac:picMk id="2" creationId="{C39CAA14-8C63-7CF9-B766-A9ECCBBDD357}"/>
+          </ac:picMkLst>
+        </pc:picChg>
+        <pc:picChg chg="add del mod">
+          <ac:chgData name="UG-Sturua, Rati" userId="9a5f4678-9511-4e7d-ac16-bb075a284ffe" providerId="ADAL" clId="{BED5191A-B82A-2C4D-A99D-5A69586E84A1}" dt="2023-03-29T13:31:39.230" v="6" actId="1076"/>
+          <ac:picMkLst>
+            <pc:docMk/>
+            <pc:sldMk cId="623594791" sldId="259"/>
+            <ac:picMk id="3" creationId="{5E9E0BB2-3EEB-AF46-99DC-72DC4F1A8163}"/>
+          </ac:picMkLst>
+        </pc:picChg>
+      </pc:sldChg>
+      <pc:sldChg chg="modSp mod">
+        <pc:chgData name="UG-Sturua, Rati" userId="9a5f4678-9511-4e7d-ac16-bb075a284ffe" providerId="ADAL" clId="{BED5191A-B82A-2C4D-A99D-5A69586E84A1}" dt="2023-03-29T12:26:13.212" v="1" actId="1076"/>
+        <pc:sldMkLst>
+          <pc:docMk/>
+          <pc:sldMk cId="2505144829" sldId="264"/>
+        </pc:sldMkLst>
+        <pc:picChg chg="mod">
+          <ac:chgData name="UG-Sturua, Rati" userId="9a5f4678-9511-4e7d-ac16-bb075a284ffe" providerId="ADAL" clId="{BED5191A-B82A-2C4D-A99D-5A69586E84A1}" dt="2023-03-29T12:26:13.212" v="1" actId="1076"/>
+          <ac:picMkLst>
+            <pc:docMk/>
+            <pc:sldMk cId="2505144829" sldId="264"/>
+            <ac:picMk id="11" creationId="{3368FCD0-6051-0146-8118-CAF00EF89378}"/>
+          </ac:picMkLst>
+        </pc:picChg>
+      </pc:sldChg>
+    </pc:docChg>
+  </pc:docChgLst>
+  <pc:docChgLst>
+    <pc:chgData name="UG-Said, Aymen" userId="f4c182cf-c069-4845-a327-2da79a835873" providerId="ADAL" clId="{46B8D05E-234E-E941-BB8B-DC15B4B66215}"/>
+    <pc:docChg chg="custSel modSld">
+      <pc:chgData name="UG-Said, Aymen" userId="f4c182cf-c069-4845-a327-2da79a835873" providerId="ADAL" clId="{46B8D05E-234E-E941-BB8B-DC15B4B66215}" dt="2023-03-29T19:19:56.687" v="3" actId="1076"/>
+      <pc:docMkLst>
+        <pc:docMk/>
+      </pc:docMkLst>
+      <pc:sldChg chg="delSp modSp mod">
+        <pc:chgData name="UG-Said, Aymen" userId="f4c182cf-c069-4845-a327-2da79a835873" providerId="ADAL" clId="{46B8D05E-234E-E941-BB8B-DC15B4B66215}" dt="2023-03-29T19:19:56.687" v="3" actId="1076"/>
+        <pc:sldMkLst>
+          <pc:docMk/>
+          <pc:sldMk cId="623594791" sldId="259"/>
+        </pc:sldMkLst>
+        <pc:picChg chg="del mod">
+          <ac:chgData name="UG-Said, Aymen" userId="f4c182cf-c069-4845-a327-2da79a835873" providerId="ADAL" clId="{46B8D05E-234E-E941-BB8B-DC15B4B66215}" dt="2023-03-29T19:19:52.104" v="2" actId="478"/>
+          <ac:picMkLst>
+            <pc:docMk/>
+            <pc:sldMk cId="623594791" sldId="259"/>
+            <ac:picMk id="2" creationId="{C39CAA14-8C63-7CF9-B766-A9ECCBBDD357}"/>
+          </ac:picMkLst>
+        </pc:picChg>
+        <pc:picChg chg="mod">
+          <ac:chgData name="UG-Said, Aymen" userId="f4c182cf-c069-4845-a327-2da79a835873" providerId="ADAL" clId="{46B8D05E-234E-E941-BB8B-DC15B4B66215}" dt="2023-03-29T19:19:56.687" v="3" actId="1076"/>
+          <ac:picMkLst>
+            <pc:docMk/>
+            <pc:sldMk cId="623594791" sldId="259"/>
+            <ac:picMk id="3" creationId="{5E9E0BB2-3EEB-AF46-99DC-72DC4F1A8163}"/>
+          </ac:picMkLst>
+        </pc:picChg>
       </pc:sldChg>
     </pc:docChg>
   </pc:docChgLst>
@@ -1898,7 +1978,7 @@
           <a:p>
             <a:fld id="{02027C1F-E3FC-6446-8286-A6EA880A696C}" type="datetimeFigureOut">
               <a:rPr lang="en-US" smtClean="0"/>
-              <a:t>3/3/23</a:t>
+              <a:t>3/29/2023</a:t>
             </a:fld>
             <a:endParaRPr lang="en-US"/>
           </a:p>
@@ -2098,7 +2178,7 @@
           <a:p>
             <a:fld id="{02027C1F-E3FC-6446-8286-A6EA880A696C}" type="datetimeFigureOut">
               <a:rPr lang="en-US" smtClean="0"/>
-              <a:t>3/3/23</a:t>
+              <a:t>3/29/2023</a:t>
             </a:fld>
             <a:endParaRPr lang="en-US"/>
           </a:p>
@@ -2308,7 +2388,7 @@
           <a:p>
             <a:fld id="{02027C1F-E3FC-6446-8286-A6EA880A696C}" type="datetimeFigureOut">
               <a:rPr lang="en-US" smtClean="0"/>
-              <a:t>3/3/23</a:t>
+              <a:t>3/29/2023</a:t>
             </a:fld>
             <a:endParaRPr lang="en-US"/>
           </a:p>
@@ -2508,7 +2588,7 @@
           <a:p>
             <a:fld id="{02027C1F-E3FC-6446-8286-A6EA880A696C}" type="datetimeFigureOut">
               <a:rPr lang="en-US" smtClean="0"/>
-              <a:t>3/3/23</a:t>
+              <a:t>3/29/2023</a:t>
             </a:fld>
             <a:endParaRPr lang="en-US"/>
           </a:p>
@@ -2784,7 +2864,7 @@
           <a:p>
             <a:fld id="{02027C1F-E3FC-6446-8286-A6EA880A696C}" type="datetimeFigureOut">
               <a:rPr lang="en-US" smtClean="0"/>
-              <a:t>3/3/23</a:t>
+              <a:t>3/29/2023</a:t>
             </a:fld>
             <a:endParaRPr lang="en-US"/>
           </a:p>
@@ -3052,7 +3132,7 @@
           <a:p>
             <a:fld id="{02027C1F-E3FC-6446-8286-A6EA880A696C}" type="datetimeFigureOut">
               <a:rPr lang="en-US" smtClean="0"/>
-              <a:t>3/3/23</a:t>
+              <a:t>3/29/2023</a:t>
             </a:fld>
             <a:endParaRPr lang="en-US"/>
           </a:p>
@@ -3467,7 +3547,7 @@
           <a:p>
             <a:fld id="{02027C1F-E3FC-6446-8286-A6EA880A696C}" type="datetimeFigureOut">
               <a:rPr lang="en-US" smtClean="0"/>
-              <a:t>3/3/23</a:t>
+              <a:t>3/29/2023</a:t>
             </a:fld>
             <a:endParaRPr lang="en-US"/>
           </a:p>
@@ -3609,7 +3689,7 @@
           <a:p>
             <a:fld id="{02027C1F-E3FC-6446-8286-A6EA880A696C}" type="datetimeFigureOut">
               <a:rPr lang="en-US" smtClean="0"/>
-              <a:t>3/3/23</a:t>
+              <a:t>3/29/2023</a:t>
             </a:fld>
             <a:endParaRPr lang="en-US"/>
           </a:p>
@@ -3722,7 +3802,7 @@
           <a:p>
             <a:fld id="{02027C1F-E3FC-6446-8286-A6EA880A696C}" type="datetimeFigureOut">
               <a:rPr lang="en-US" smtClean="0"/>
-              <a:t>3/3/23</a:t>
+              <a:t>3/29/2023</a:t>
             </a:fld>
             <a:endParaRPr lang="en-US"/>
           </a:p>
@@ -4035,7 +4115,7 @@
           <a:p>
             <a:fld id="{02027C1F-E3FC-6446-8286-A6EA880A696C}" type="datetimeFigureOut">
               <a:rPr lang="en-US" smtClean="0"/>
-              <a:t>3/3/23</a:t>
+              <a:t>3/29/2023</a:t>
             </a:fld>
             <a:endParaRPr lang="en-US"/>
           </a:p>
@@ -4324,7 +4404,7 @@
           <a:p>
             <a:fld id="{02027C1F-E3FC-6446-8286-A6EA880A696C}" type="datetimeFigureOut">
               <a:rPr lang="en-US" smtClean="0"/>
-              <a:t>3/3/23</a:t>
+              <a:t>3/29/2023</a:t>
             </a:fld>
             <a:endParaRPr lang="en-US"/>
           </a:p>
@@ -4567,7 +4647,7 @@
           <a:p>
             <a:fld id="{02027C1F-E3FC-6446-8286-A6EA880A696C}" type="datetimeFigureOut">
               <a:rPr lang="en-US" smtClean="0"/>
-              <a:t>3/3/23</a:t>
+              <a:t>3/29/2023</a:t>
             </a:fld>
             <a:endParaRPr lang="en-US"/>
           </a:p>
@@ -5020,7 +5100,7 @@
           <a:lstStyle/>
           <a:p>
             <a:r>
-              <a:rPr lang="en-US" b="1" u="sng" dirty="0">
+              <a:rPr lang="en-US" b="1" u="sng">
                 <a:latin typeface="+mn-lt"/>
               </a:rPr>
               <a:t>GUI Design – User Navigation</a:t>
@@ -5066,21 +5146,21 @@
           <a:lstStyle/>
           <a:p>
             <a:r>
-              <a:rPr lang="en-US" dirty="0"/>
+              <a:rPr lang="en-US"/>
               <a:t>Author: </a:t>
             </a:r>
             <a:r>
-              <a:rPr lang="en-US" dirty="0" err="1"/>
+              <a:rPr lang="en-US" err="1"/>
               <a:t>Aymen</a:t>
             </a:r>
             <a:r>
-              <a:rPr lang="en-US" dirty="0"/>
+              <a:rPr lang="en-US"/>
               <a:t> Said</a:t>
             </a:r>
           </a:p>
           <a:p>
             <a:r>
-              <a:rPr lang="en-US" dirty="0"/>
+              <a:rPr lang="en-US"/>
               <a:t>Version 1.9 (Final)</a:t>
             </a:r>
           </a:p>
@@ -5088,7 +5168,7 @@
             <a:pPr marL="0" indent="0">
               <a:buNone/>
             </a:pPr>
-            <a:endParaRPr lang="en-US" dirty="0"/>
+            <a:endParaRPr lang="en-US"/>
           </a:p>
           <a:p>
             <a:pPr marL="0" indent="0" algn="ctr">
@@ -5101,7 +5181,7 @@
               <a:buNone/>
             </a:pPr>
             <a:r>
-              <a:rPr lang="en-US" sz="1800" b="1" dirty="0"/>
+              <a:rPr lang="en-US" sz="1800" b="1"/>
               <a:t>Version History:</a:t>
             </a:r>
           </a:p>
@@ -5115,7 +5195,7 @@
               </a:spcBef>
             </a:pPr>
             <a:r>
-              <a:rPr lang="en-GB" sz="1800" dirty="0">
+              <a:rPr lang="en-GB" sz="1800">
                 <a:effectLst/>
                 <a:latin typeface="Calibri" panose="020F0502020204030204" pitchFamily="34" charset="0"/>
                 <a:ea typeface="Calibri" panose="020F0502020204030204" pitchFamily="34" charset="0"/>
@@ -5124,7 +5204,7 @@
               <a:t>1.0 – Creation of the GUI design; added images, panel, and labels </a:t>
             </a:r>
             <a:r>
-              <a:rPr lang="en-GB" sz="1800" i="1" dirty="0">
+              <a:rPr lang="en-GB" sz="1800" i="1">
                 <a:effectLst/>
                 <a:latin typeface="Calibri" panose="020F0502020204030204" pitchFamily="34" charset="0"/>
                 <a:ea typeface="Calibri" panose="020F0502020204030204" pitchFamily="34" charset="0"/>
@@ -5143,7 +5223,7 @@
               </a:spcBef>
             </a:pPr>
             <a:r>
-              <a:rPr lang="en-GB" sz="1800" dirty="0">
+              <a:rPr lang="en-GB" sz="1800">
                 <a:effectLst/>
                 <a:latin typeface="Calibri" panose="020F0502020204030204" pitchFamily="34" charset="0"/>
                 <a:ea typeface="Calibri" panose="020F0502020204030204" pitchFamily="34" charset="0"/>
@@ -5152,19 +5232,19 @@
               <a:t>1.1– Added checkbox, button, text fields and made the GUI design more modern; created this document and added all the attributes</a:t>
             </a:r>
             <a:r>
-              <a:rPr lang="en-GB" sz="1800" dirty="0">
+              <a:rPr lang="en-GB" sz="1800">
                 <a:effectLst/>
               </a:rPr>
               <a:t> </a:t>
             </a:r>
             <a:r>
-              <a:rPr lang="en-GB" sz="1800" i="1" dirty="0">
+              <a:rPr lang="en-GB" sz="1800" i="1">
                 <a:effectLst/>
               </a:rPr>
               <a:t>(</a:t>
             </a:r>
             <a:r>
-              <a:rPr lang="en-GB" sz="1800" i="1" dirty="0">
+              <a:rPr lang="en-GB" sz="1800" i="1">
                 <a:effectLst/>
                 <a:latin typeface="Calibri" panose="020F0502020204030204" pitchFamily="34" charset="0"/>
                 <a:ea typeface="Calibri" panose="020F0502020204030204" pitchFamily="34" charset="0"/>
@@ -5173,12 +5253,12 @@
               <a:t>25/02/23)</a:t>
             </a:r>
             <a:r>
-              <a:rPr lang="en-GB" sz="1200" i="1" dirty="0">
+              <a:rPr lang="en-GB" sz="1200" i="1">
                 <a:effectLst/>
               </a:rPr>
               <a:t> </a:t>
             </a:r>
-            <a:endParaRPr lang="en-GB" sz="1800" i="1" dirty="0">
+            <a:endParaRPr lang="en-GB" sz="1800" i="1">
               <a:effectLst/>
             </a:endParaRPr>
           </a:p>
@@ -5192,7 +5272,7 @@
               </a:spcBef>
             </a:pPr>
             <a:r>
-              <a:rPr lang="en-GB" sz="1800" dirty="0">
+              <a:rPr lang="en-GB" sz="1800">
                 <a:effectLst/>
                 <a:latin typeface="Calibri" panose="020F0502020204030204" pitchFamily="34" charset="0"/>
                 <a:ea typeface="Calibri" panose="020F0502020204030204" pitchFamily="34" charset="0"/>
@@ -5201,18 +5281,18 @@
               <a:t>1.2 – Made another GUI for the signup page</a:t>
             </a:r>
             <a:r>
-              <a:rPr lang="en-GB" sz="1800" dirty="0">
+              <a:rPr lang="en-GB" sz="1800">
                 <a:effectLst/>
               </a:rPr>
               <a:t> </a:t>
             </a:r>
             <a:r>
-              <a:rPr lang="en-GB" sz="1800" i="1" dirty="0">
+              <a:rPr lang="en-GB" sz="1800" i="1">
                 <a:effectLst/>
               </a:rPr>
               <a:t>(26/02/23)</a:t>
             </a:r>
-            <a:endParaRPr lang="en-GB" sz="1800" dirty="0">
+            <a:endParaRPr lang="en-GB" sz="1800">
               <a:effectLst/>
             </a:endParaRPr>
           </a:p>
@@ -5226,7 +5306,7 @@
               </a:spcBef>
             </a:pPr>
             <a:r>
-              <a:rPr lang="en-GB" sz="1800" dirty="0">
+              <a:rPr lang="en-GB" sz="1800">
                 <a:effectLst/>
                 <a:latin typeface="Calibri" panose="020F0502020204030204" pitchFamily="34" charset="0"/>
                 <a:ea typeface="Calibri" panose="020F0502020204030204" pitchFamily="34" charset="0"/>
@@ -5235,7 +5315,7 @@
               <a:t>1.3 – Continued working on the GUI; re-watched lecture 3 online of designing GUI and made a rough design </a:t>
             </a:r>
             <a:r>
-              <a:rPr lang="en-GB" sz="1800" i="1" dirty="0">
+              <a:rPr lang="en-GB" sz="1800" i="1">
                 <a:latin typeface="Calibri" panose="020F0502020204030204" pitchFamily="34" charset="0"/>
                 <a:ea typeface="Calibri" panose="020F0502020204030204" pitchFamily="34" charset="0"/>
                 <a:cs typeface="Times New Roman" panose="02020603050405020304" pitchFamily="18" charset="0"/>
@@ -5253,14 +5333,14 @@
               </a:spcBef>
             </a:pPr>
             <a:r>
-              <a:rPr lang="en-US" sz="1800" dirty="0"/>
+              <a:rPr lang="en-US" sz="1800"/>
               <a:t>1.4 – User Navigation (GUI) has been created; added slide 2 </a:t>
             </a:r>
             <a:r>
-              <a:rPr lang="en-US" sz="1800" i="1" dirty="0"/>
+              <a:rPr lang="en-US" sz="1800" i="1"/>
               <a:t>(28/02/23)</a:t>
             </a:r>
-            <a:endParaRPr lang="en-GB" sz="1800" i="1" dirty="0">
+            <a:endParaRPr lang="en-GB" sz="1800" i="1">
               <a:effectLst/>
               <a:latin typeface="Calibri" panose="020F0502020204030204" pitchFamily="34" charset="0"/>
               <a:ea typeface="Calibri" panose="020F0502020204030204" pitchFamily="34" charset="0"/>
@@ -5277,7 +5357,7 @@
               </a:spcBef>
             </a:pPr>
             <a:r>
-              <a:rPr lang="en-GB" sz="1800" dirty="0">
+              <a:rPr lang="en-GB" sz="1800">
                 <a:effectLst/>
                 <a:latin typeface="Calibri" panose="020F0502020204030204" pitchFamily="34" charset="0"/>
                 <a:ea typeface="Calibri" panose="020F0502020204030204" pitchFamily="34" charset="0"/>
@@ -5286,7 +5366,7 @@
               <a:t>1.5 – Removed the background image and replaced it a grey panel; finished designing the 9 GUIs Wireframe; reworked on the GUI rough design again; added a long description of all the GUI pages; re-designed the Login page </a:t>
             </a:r>
             <a:r>
-              <a:rPr lang="en-GB" sz="1800" i="1" dirty="0">
+              <a:rPr lang="en-GB" sz="1800" i="1">
                 <a:effectLst/>
                 <a:latin typeface="Calibri" panose="020F0502020204030204" pitchFamily="34" charset="0"/>
                 <a:ea typeface="Calibri" panose="020F0502020204030204" pitchFamily="34" charset="0"/>
@@ -5295,12 +5375,12 @@
               <a:t>(01/03/23)</a:t>
             </a:r>
             <a:r>
-              <a:rPr lang="en-GB" sz="1800" dirty="0">
+              <a:rPr lang="en-GB" sz="1800">
                 <a:effectLst/>
               </a:rPr>
               <a:t>  </a:t>
             </a:r>
-            <a:endParaRPr lang="en-US" sz="1800" dirty="0"/>
+            <a:endParaRPr lang="en-US" sz="1800"/>
           </a:p>
           <a:p>
             <a:pPr>
@@ -5312,11 +5392,11 @@
               </a:spcBef>
             </a:pPr>
             <a:r>
-              <a:rPr lang="en-US" sz="1800" dirty="0"/>
+              <a:rPr lang="en-US" sz="1800"/>
               <a:t>1.6 – Added slide 3, 4 </a:t>
             </a:r>
             <a:r>
-              <a:rPr lang="en-US" sz="1800" i="1" dirty="0"/>
+              <a:rPr lang="en-US" sz="1800" i="1"/>
               <a:t>(01/03/23)</a:t>
             </a:r>
           </a:p>
@@ -5330,11 +5410,11 @@
               </a:spcBef>
             </a:pPr>
             <a:r>
-              <a:rPr lang="en-US" sz="1800" dirty="0"/>
+              <a:rPr lang="en-US" sz="1800"/>
               <a:t>1.7 – Added slide 5, 6, 7, 8, 9, 10, 11; refined some of the slides </a:t>
             </a:r>
             <a:r>
-              <a:rPr lang="en-US" sz="1800" i="1" dirty="0"/>
+              <a:rPr lang="en-US" sz="1800" i="1"/>
               <a:t>(02/03/23)</a:t>
             </a:r>
           </a:p>
@@ -5348,11 +5428,11 @@
               </a:spcBef>
             </a:pPr>
             <a:r>
-              <a:rPr lang="en-US" sz="1800" dirty="0"/>
+              <a:rPr lang="en-US" sz="1800"/>
               <a:t>1.8 – Added heading/title for each slide </a:t>
             </a:r>
             <a:r>
-              <a:rPr lang="en-US" sz="1800" i="1" dirty="0"/>
+              <a:rPr lang="en-US" sz="1800" i="1"/>
               <a:t>(03/02/23) </a:t>
             </a:r>
           </a:p>
@@ -5366,23 +5446,11 @@
               </a:spcBef>
             </a:pPr>
             <a:r>
-              <a:rPr lang="en-US" sz="1800" dirty="0"/>
-              <a:t>1.9 – Added ”System Administrator” role onto Combo Box; removed “ID” text field from Add User Page; added “Sign out” button on Welcome Page; </a:t>
-            </a:r>
-            <a:r>
               <a:rPr lang="en-US" sz="1800"/>
-              <a:t>re-updated slide 1, </a:t>
-            </a:r>
-            <a:r>
-              <a:rPr lang="en-US" sz="1800" dirty="0"/>
-              <a:t>3, 6</a:t>
-            </a:r>
-            <a:r>
-              <a:rPr lang="en-US" sz="1800"/>
-              <a:t>, 7, 8, 10 </a:t>
-            </a:r>
-            <a:r>
-              <a:rPr lang="en-US" sz="1800" i="1" dirty="0"/>
+              <a:t>1.9 – Added ”System Administrator” role onto Combo Box; removed “ID” text field from Add User Page; added “Sign out” button on Welcome Page; re-updated slide 1, 3, 6, 7, 8, 10 </a:t>
+            </a:r>
+            <a:r>
+              <a:rPr lang="en-US" sz="1800" i="1"/>
               <a:t>(03/02/23) </a:t>
             </a:r>
           </a:p>
@@ -5395,7 +5463,7 @@
                 <a:spcPts val="0"/>
               </a:spcBef>
             </a:pPr>
-            <a:endParaRPr lang="en-US" sz="1800" dirty="0"/>
+            <a:endParaRPr lang="en-US" sz="1800"/>
           </a:p>
         </p:txBody>
       </p:sp>
@@ -5504,7 +5572,7 @@
           <a:p>
             <a:pPr algn="ctr"/>
             <a:r>
-              <a:rPr lang="en-US" sz="1400" dirty="0"/>
+              <a:rPr lang="en-US" sz="1400"/>
               <a:t>Shows alerts based on the description you typed</a:t>
             </a:r>
           </a:p>
@@ -5555,7 +5623,7 @@
           <a:p>
             <a:pPr algn="ctr"/>
             <a:r>
-              <a:rPr lang="en-US" sz="1400" dirty="0"/>
+              <a:rPr lang="en-US" sz="1400"/>
               <a:t>Shows alerts based on a specific severity you chose</a:t>
             </a:r>
           </a:p>
@@ -5690,7 +5758,7 @@
           <a:p>
             <a:pPr algn="ctr"/>
             <a:r>
-              <a:rPr lang="en-US" sz="1400" dirty="0"/>
+              <a:rPr lang="en-US" sz="1400"/>
               <a:t>Alert details is being printed</a:t>
             </a:r>
           </a:p>
@@ -5741,7 +5809,7 @@
           <a:p>
             <a:pPr algn="ctr"/>
             <a:r>
-              <a:rPr lang="en-US" sz="1400" dirty="0"/>
+              <a:rPr lang="en-US" sz="1400"/>
               <a:t>Welcome Page</a:t>
             </a:r>
           </a:p>
@@ -5874,7 +5942,7 @@
           <a:lstStyle/>
           <a:p>
             <a:r>
-              <a:rPr lang="en-US" sz="3200" b="1" u="sng" dirty="0"/>
+              <a:rPr lang="en-US" sz="3200" b="1" u="sng"/>
               <a:t>ALERTS PAGE</a:t>
             </a:r>
           </a:p>
@@ -6060,7 +6128,7 @@
           <a:p>
             <a:pPr algn="ctr"/>
             <a:r>
-              <a:rPr lang="en-US" sz="1400" dirty="0"/>
+              <a:rPr lang="en-US" sz="1400"/>
               <a:t>Welcome Page</a:t>
             </a:r>
           </a:p>
@@ -6155,7 +6223,7 @@
           <a:p>
             <a:pPr algn="ctr"/>
             <a:r>
-              <a:rPr lang="en-US" sz="1400" dirty="0"/>
+              <a:rPr lang="en-US" sz="1400"/>
               <a:t>Select a user to proceed the refund</a:t>
             </a:r>
           </a:p>
@@ -6292,7 +6360,7 @@
           <a:p>
             <a:pPr algn="ctr"/>
             <a:r>
-              <a:rPr lang="en-US" sz="1400" dirty="0"/>
+              <a:rPr lang="en-US" sz="1400"/>
               <a:t>Outputs: Refund has been proceeded</a:t>
             </a:r>
           </a:p>
@@ -6426,7 +6494,7 @@
           <a:p>
             <a:pPr algn="ctr"/>
             <a:r>
-              <a:rPr lang="en-US" sz="1400" dirty="0"/>
+              <a:rPr lang="en-US" sz="1400"/>
               <a:t>Money has been sent back to the selected user</a:t>
             </a:r>
           </a:p>
@@ -6474,7 +6542,7 @@
           <a:lstStyle/>
           <a:p>
             <a:r>
-              <a:rPr lang="en-US" sz="3200" b="1" u="sng" dirty="0"/>
+              <a:rPr lang="en-US" sz="3200" b="1" u="sng"/>
               <a:t>REFUND PAGE</a:t>
             </a:r>
           </a:p>
@@ -6555,7 +6623,7 @@
           <a:p>
             <a:pPr algn="ctr"/>
             <a:r>
-              <a:rPr lang="en-US" sz="1400" dirty="0"/>
+              <a:rPr lang="en-US" sz="1400"/>
               <a:t>Welcome</a:t>
             </a:r>
           </a:p>
@@ -6606,7 +6674,7 @@
           <a:p>
             <a:pPr algn="ctr"/>
             <a:r>
-              <a:rPr lang="en-US" sz="1400" dirty="0"/>
+              <a:rPr lang="en-US" sz="1400"/>
               <a:t>User Management</a:t>
             </a:r>
           </a:p>
@@ -6655,7 +6723,7 @@
           <a:p>
             <a:pPr algn="ctr"/>
             <a:r>
-              <a:rPr lang="en-US" sz="1400" dirty="0"/>
+              <a:rPr lang="en-US" sz="1400"/>
               <a:t>Is the user registered?</a:t>
             </a:r>
           </a:p>
@@ -6706,7 +6774,7 @@
           <a:p>
             <a:pPr algn="ctr"/>
             <a:r>
-              <a:rPr lang="en-US" sz="1400" dirty="0"/>
+              <a:rPr lang="en-US" sz="1400"/>
               <a:t>Signup</a:t>
             </a:r>
           </a:p>
@@ -6883,7 +6951,7 @@
           <a:p>
             <a:pPr algn="ctr"/>
             <a:r>
-              <a:rPr lang="en-US" sz="1400" dirty="0"/>
+              <a:rPr lang="en-US" sz="1400"/>
               <a:t>Valid Details?</a:t>
             </a:r>
           </a:p>
@@ -7065,7 +7133,7 @@
           <a:p>
             <a:pPr algn="ctr"/>
             <a:r>
-              <a:rPr lang="en-US" sz="1400" dirty="0"/>
+              <a:rPr lang="en-US" sz="1400"/>
               <a:t>Report</a:t>
             </a:r>
           </a:p>
@@ -7116,7 +7184,7 @@
           <a:p>
             <a:pPr algn="ctr"/>
             <a:r>
-              <a:rPr lang="en-US" sz="1400" dirty="0"/>
+              <a:rPr lang="en-US" sz="1400"/>
               <a:t>Add User</a:t>
             </a:r>
           </a:p>
@@ -7167,7 +7235,7 @@
           <a:p>
             <a:pPr algn="ctr"/>
             <a:r>
-              <a:rPr lang="en-US" sz="1400" dirty="0"/>
+              <a:rPr lang="en-US" sz="1400"/>
               <a:t>Remove User</a:t>
             </a:r>
           </a:p>
@@ -7218,7 +7286,7 @@
           <a:p>
             <a:pPr algn="ctr"/>
             <a:r>
-              <a:rPr lang="en-US" sz="1400" dirty="0"/>
+              <a:rPr lang="en-US" sz="1400"/>
               <a:t>Edit User</a:t>
             </a:r>
           </a:p>
@@ -7269,7 +7337,7 @@
           <a:p>
             <a:pPr algn="ctr"/>
             <a:r>
-              <a:rPr lang="en-US" sz="1400" dirty="0"/>
+              <a:rPr lang="en-US" sz="1400"/>
               <a:t>Stock</a:t>
             </a:r>
           </a:p>
@@ -7320,7 +7388,7 @@
           <a:p>
             <a:pPr algn="ctr"/>
             <a:r>
-              <a:rPr lang="en-US" sz="1400" dirty="0"/>
+              <a:rPr lang="en-US" sz="1400"/>
               <a:t>Sales</a:t>
             </a:r>
           </a:p>
@@ -7371,7 +7439,7 @@
           <a:p>
             <a:pPr algn="ctr"/>
             <a:r>
-              <a:rPr lang="en-US" sz="1400" dirty="0"/>
+              <a:rPr lang="en-US" sz="1400"/>
               <a:t>Transactions</a:t>
             </a:r>
           </a:p>
@@ -7422,7 +7490,7 @@
           <a:p>
             <a:pPr algn="ctr"/>
             <a:r>
-              <a:rPr lang="en-US" sz="1400" dirty="0"/>
+              <a:rPr lang="en-US" sz="1400"/>
               <a:t>Alerts</a:t>
             </a:r>
           </a:p>
@@ -7714,7 +7782,7 @@
           <a:lstStyle/>
           <a:p>
             <a:r>
-              <a:rPr lang="en-US" dirty="0"/>
+              <a:rPr lang="en-US"/>
               <a:t>Yes</a:t>
             </a:r>
           </a:p>
@@ -7749,7 +7817,7 @@
           <a:lstStyle/>
           <a:p>
             <a:r>
-              <a:rPr lang="en-US" dirty="0"/>
+              <a:rPr lang="en-US"/>
               <a:t>No</a:t>
             </a:r>
           </a:p>
@@ -7784,7 +7852,7 @@
           <a:lstStyle/>
           <a:p>
             <a:r>
-              <a:rPr lang="en-US" dirty="0"/>
+              <a:rPr lang="en-US"/>
               <a:t>Yes</a:t>
             </a:r>
           </a:p>
@@ -7819,7 +7887,7 @@
           <a:lstStyle/>
           <a:p>
             <a:r>
-              <a:rPr lang="en-US" dirty="0"/>
+              <a:rPr lang="en-US"/>
               <a:t>No</a:t>
             </a:r>
           </a:p>
@@ -7995,7 +8063,7 @@
           <a:p>
             <a:pPr algn="ctr"/>
             <a:r>
-              <a:rPr lang="en-US" sz="1400" dirty="0"/>
+              <a:rPr lang="en-US" sz="1400"/>
               <a:t>Commission</a:t>
             </a:r>
           </a:p>
@@ -8089,7 +8157,7 @@
           <a:p>
             <a:pPr algn="ctr"/>
             <a:r>
-              <a:rPr lang="en-US" sz="1400" dirty="0"/>
+              <a:rPr lang="en-US" sz="1400"/>
               <a:t>Refunds</a:t>
             </a:r>
           </a:p>
@@ -8185,7 +8253,7 @@
           <a:p>
             <a:pPr algn="ctr"/>
             <a:r>
-              <a:rPr lang="en-US" sz="1400" dirty="0"/>
+              <a:rPr lang="en-US" sz="1400"/>
               <a:t>Login</a:t>
             </a:r>
           </a:p>
@@ -8236,7 +8304,7 @@
           <a:p>
             <a:pPr algn="ctr"/>
             <a:r>
-              <a:rPr lang="en-US" sz="1400" dirty="0"/>
+              <a:rPr lang="en-US" sz="1400"/>
               <a:t>Description</a:t>
             </a:r>
           </a:p>
@@ -8287,7 +8355,7 @@
           <a:p>
             <a:pPr algn="ctr"/>
             <a:r>
-              <a:rPr lang="en-US" sz="1400" dirty="0"/>
+              <a:rPr lang="en-US" sz="1400"/>
               <a:t>Severity</a:t>
             </a:r>
           </a:p>
@@ -8338,7 +8406,7 @@
           <a:p>
             <a:pPr algn="ctr"/>
             <a:r>
-              <a:rPr lang="en-US" sz="1400" dirty="0"/>
+              <a:rPr lang="en-US" sz="1400"/>
               <a:t>Status</a:t>
             </a:r>
           </a:p>
@@ -8473,7 +8541,7 @@
           <a:p>
             <a:pPr algn="ctr"/>
             <a:r>
-              <a:rPr lang="en-US" sz="1400" dirty="0"/>
+              <a:rPr lang="en-US" sz="1400"/>
               <a:t>Last Modified</a:t>
             </a:r>
           </a:p>
@@ -8610,7 +8678,7 @@
           <a:p>
             <a:pPr algn="ctr"/>
             <a:r>
-              <a:rPr lang="en-US" sz="1400" dirty="0"/>
+              <a:rPr lang="en-US" sz="1400"/>
               <a:t>Card Number</a:t>
             </a:r>
           </a:p>
@@ -8661,7 +8729,7 @@
           <a:p>
             <a:pPr algn="ctr"/>
             <a:r>
-              <a:rPr lang="en-US" sz="1400" dirty="0"/>
+              <a:rPr lang="en-US" sz="1400"/>
               <a:t>Full Name</a:t>
             </a:r>
           </a:p>
@@ -8712,7 +8780,7 @@
           <a:p>
             <a:pPr algn="ctr"/>
             <a:r>
-              <a:rPr lang="en-US" sz="1400" dirty="0"/>
+              <a:rPr lang="en-US" sz="1400"/>
               <a:t>Ticket</a:t>
             </a:r>
           </a:p>
@@ -8805,7 +8873,7 @@
           <a:p>
             <a:pPr algn="ctr"/>
             <a:r>
-              <a:rPr lang="en-US" sz="1400" dirty="0"/>
+              <a:rPr lang="en-US" sz="1400"/>
               <a:t>USD</a:t>
             </a:r>
           </a:p>
@@ -9013,14 +9081,14 @@
           <a:lstStyle/>
           <a:p>
             <a:r>
-              <a:rPr lang="en-US" sz="1400" dirty="0">
+              <a:rPr lang="en-US" sz="1400">
                 <a:solidFill>
                   <a:schemeClr val="bg1"/>
                 </a:solidFill>
               </a:rPr>
               <a:t>Start</a:t>
             </a:r>
-            <a:endParaRPr lang="en-US" dirty="0">
+            <a:endParaRPr lang="en-US">
               <a:solidFill>
                 <a:schemeClr val="bg1"/>
               </a:solidFill>
@@ -9112,7 +9180,7 @@
           <a:lstStyle/>
           <a:p>
             <a:r>
-              <a:rPr lang="en-US" sz="3200" b="1" u="sng" dirty="0"/>
+              <a:rPr lang="en-US" sz="3200" b="1" u="sng"/>
               <a:t>OVERALL LAYOUT</a:t>
             </a:r>
           </a:p>
@@ -9305,7 +9373,7 @@
           <a:p>
             <a:pPr algn="ctr"/>
             <a:r>
-              <a:rPr lang="en-US" sz="1400" dirty="0"/>
+              <a:rPr lang="en-US" sz="1400"/>
               <a:t>Valid Details?</a:t>
             </a:r>
           </a:p>
@@ -9399,7 +9467,7 @@
           <a:p>
             <a:pPr algn="ctr"/>
             <a:r>
-              <a:rPr lang="en-US" sz="1400" dirty="0"/>
+              <a:rPr lang="en-US" sz="1400"/>
               <a:t>Welcome Page</a:t>
             </a:r>
           </a:p>
@@ -9476,7 +9544,7 @@
           <a:lstStyle/>
           <a:p>
             <a:r>
-              <a:rPr lang="en-US" dirty="0"/>
+              <a:rPr lang="en-US"/>
               <a:t>No</a:t>
             </a:r>
           </a:p>
@@ -9511,7 +9579,7 @@
           <a:lstStyle/>
           <a:p>
             <a:r>
-              <a:rPr lang="en-US" dirty="0"/>
+              <a:rPr lang="en-US"/>
               <a:t>Yes</a:t>
             </a:r>
           </a:p>
@@ -9605,7 +9673,7 @@
           <a:p>
             <a:pPr algn="ctr"/>
             <a:r>
-              <a:rPr lang="en-US" sz="1400" dirty="0"/>
+              <a:rPr lang="en-US" sz="1400"/>
               <a:t>Change Password Page</a:t>
             </a:r>
           </a:p>
@@ -9656,7 +9724,7 @@
           <a:p>
             <a:pPr algn="ctr"/>
             <a:r>
-              <a:rPr lang="en-US" sz="1400" dirty="0"/>
+              <a:rPr lang="en-US" sz="1400"/>
               <a:t>Sign up Page</a:t>
             </a:r>
           </a:p>
@@ -9704,7 +9772,7 @@
           <a:lstStyle/>
           <a:p>
             <a:r>
-              <a:rPr lang="en-US" sz="3200" b="1" u="sng" dirty="0"/>
+              <a:rPr lang="en-US" sz="3200" b="1" u="sng"/>
               <a:t>LOGIN PAGE</a:t>
             </a:r>
           </a:p>
@@ -9854,7 +9922,7 @@
           <a:p>
             <a:pPr algn="ctr"/>
             <a:r>
-              <a:rPr lang="en-US" sz="1400" dirty="0"/>
+              <a:rPr lang="en-US" sz="1400"/>
               <a:t>Welcome Page</a:t>
             </a:r>
           </a:p>
@@ -9902,7 +9970,7 @@
           <a:lstStyle/>
           <a:p>
             <a:r>
-              <a:rPr lang="en-US" sz="3200" b="1" u="sng" dirty="0"/>
+              <a:rPr lang="en-US" sz="3200" b="1" u="sng"/>
               <a:t>SIGN UP PAGE</a:t>
             </a:r>
           </a:p>
@@ -9960,7 +10028,7 @@
         </p:blipFill>
         <p:spPr>
           <a:xfrm>
-            <a:off x="618384" y="515393"/>
+            <a:off x="608412" y="515392"/>
             <a:ext cx="6909757" cy="5195177"/>
           </a:xfrm>
           <a:prstGeom prst="rect">
@@ -10013,7 +10081,7 @@
           <a:p>
             <a:pPr algn="ctr"/>
             <a:r>
-              <a:rPr lang="en-US" sz="1400" dirty="0"/>
+              <a:rPr lang="en-US" sz="1400"/>
               <a:t>Login</a:t>
             </a:r>
           </a:p>
@@ -10064,7 +10132,7 @@
           <a:p>
             <a:pPr algn="ctr"/>
             <a:r>
-              <a:rPr lang="en-US" sz="1400" dirty="0"/>
+              <a:rPr lang="en-US" sz="1400"/>
               <a:t>User Management</a:t>
             </a:r>
           </a:p>
@@ -10112,25 +10180,25 @@
           <a:lstStyle/>
           <a:p>
             <a:r>
-              <a:rPr lang="en-US" dirty="0"/>
+              <a:rPr lang="en-US"/>
               <a:t>We will make two versions of the “Change Password GUI” in the development phase.</a:t>
             </a:r>
           </a:p>
           <a:p>
-            <a:endParaRPr lang="en-US" dirty="0"/>
-          </a:p>
-          <a:p>
-            <a:r>
-              <a:rPr lang="en-US" dirty="0"/>
+            <a:endParaRPr lang="en-US"/>
+          </a:p>
+          <a:p>
+            <a:r>
+              <a:rPr lang="en-US"/>
               <a:t>One version from the “Login Page” (Forgotten your password?) and the other version from the “User Management Page” (Change Password).</a:t>
             </a:r>
           </a:p>
           <a:p>
-            <a:endParaRPr lang="en-US" dirty="0"/>
-          </a:p>
-          <a:p>
-            <a:r>
-              <a:rPr lang="en-US" dirty="0"/>
+            <a:endParaRPr lang="en-US"/>
+          </a:p>
+          <a:p>
+            <a:r>
+              <a:rPr lang="en-US"/>
               <a:t>Both versions will be identical but will navigate the user back to their previous page once the user have clicked on the “Confirm” button.</a:t>
             </a:r>
           </a:p>
@@ -10179,7 +10247,7 @@
           <a:p>
             <a:pPr algn="ctr"/>
             <a:r>
-              <a:rPr lang="en-US" sz="1400" dirty="0"/>
+              <a:rPr lang="en-US" sz="1400"/>
               <a:t>Was the previous page from Login or User Management?</a:t>
             </a:r>
           </a:p>
@@ -10300,10 +10368,10 @@
           <a:lstStyle/>
           <a:p>
             <a:r>
-              <a:rPr lang="en-US" sz="1200" dirty="0"/>
+              <a:rPr lang="en-US" sz="1200"/>
               <a:t>Login</a:t>
             </a:r>
-            <a:endParaRPr lang="en-US" dirty="0"/>
+            <a:endParaRPr lang="en-US"/>
           </a:p>
         </p:txBody>
       </p:sp>
@@ -10336,13 +10404,13 @@
           <a:lstStyle/>
           <a:p>
             <a:r>
-              <a:rPr lang="en-US" sz="1100" dirty="0"/>
+              <a:rPr lang="en-US" sz="1100"/>
               <a:t>User</a:t>
             </a:r>
           </a:p>
           <a:p>
             <a:r>
-              <a:rPr lang="en-US" sz="1100" dirty="0"/>
+              <a:rPr lang="en-US" sz="1100"/>
               <a:t>Management</a:t>
             </a:r>
           </a:p>
@@ -10478,7 +10546,7 @@
           <a:p>
             <a:pPr algn="ctr"/>
             <a:r>
-              <a:rPr lang="en-US" sz="1400" dirty="0"/>
+              <a:rPr lang="en-US" sz="1400"/>
               <a:t>Password has been changed</a:t>
             </a:r>
           </a:p>
@@ -10568,7 +10636,7 @@
           <a:lstStyle/>
           <a:p>
             <a:r>
-              <a:rPr lang="en-US" sz="3200" b="1" u="sng" dirty="0"/>
+              <a:rPr lang="en-US" sz="3200" b="1" u="sng"/>
               <a:t>CHANGE PASSWORD PAGE</a:t>
             </a:r>
           </a:p>
@@ -10835,7 +10903,7 @@
           <a:p>
             <a:pPr algn="ctr"/>
             <a:r>
-              <a:rPr lang="en-US" sz="1400" dirty="0"/>
+              <a:rPr lang="en-US" sz="1400"/>
               <a:t>User Management Page</a:t>
             </a:r>
           </a:p>
@@ -10886,7 +10954,7 @@
           <a:p>
             <a:pPr algn="ctr"/>
             <a:r>
-              <a:rPr lang="en-US" sz="1400" dirty="0"/>
+              <a:rPr lang="en-US" sz="1400"/>
               <a:t>Report Page</a:t>
             </a:r>
           </a:p>
@@ -10937,7 +11005,7 @@
           <a:p>
             <a:pPr algn="ctr"/>
             <a:r>
-              <a:rPr lang="en-US" sz="1400" dirty="0"/>
+              <a:rPr lang="en-US" sz="1400"/>
               <a:t>Alerts Page</a:t>
             </a:r>
           </a:p>
@@ -10988,7 +11056,7 @@
           <a:p>
             <a:pPr algn="ctr"/>
             <a:r>
-              <a:rPr lang="en-US" sz="1400" dirty="0"/>
+              <a:rPr lang="en-US" sz="1400"/>
               <a:t>Refunds Page</a:t>
             </a:r>
           </a:p>
@@ -11036,7 +11104,7 @@
           <a:lstStyle/>
           <a:p>
             <a:r>
-              <a:rPr lang="en-US" sz="3200" b="1" u="sng" dirty="0"/>
+              <a:rPr lang="en-US" sz="3200" b="1" u="sng"/>
               <a:t>WELCOME PAGE</a:t>
             </a:r>
           </a:p>
@@ -11087,7 +11155,7 @@
           <a:p>
             <a:pPr algn="ctr"/>
             <a:r>
-              <a:rPr lang="en-US" sz="1400" dirty="0"/>
+              <a:rPr lang="en-US" sz="1400"/>
               <a:t>Login Page</a:t>
             </a:r>
           </a:p>
@@ -11279,7 +11347,7 @@
           <a:p>
             <a:pPr algn="ctr"/>
             <a:r>
-              <a:rPr lang="en-US" sz="1400" dirty="0"/>
+              <a:rPr lang="en-US" sz="1400"/>
               <a:t>Change Password Page</a:t>
             </a:r>
           </a:p>
@@ -11371,7 +11439,7 @@
           <a:p>
             <a:pPr algn="ctr"/>
             <a:r>
-              <a:rPr lang="en-US" sz="1400" dirty="0"/>
+              <a:rPr lang="en-US" sz="1400"/>
               <a:t>Welcome Page</a:t>
             </a:r>
           </a:p>
@@ -11467,7 +11535,7 @@
           <a:p>
             <a:pPr algn="ctr"/>
             <a:r>
-              <a:rPr lang="en-US" sz="1400" dirty="0"/>
+              <a:rPr lang="en-US" sz="1400"/>
               <a:t>User details saved on database</a:t>
             </a:r>
           </a:p>
@@ -11518,7 +11586,7 @@
           <a:p>
             <a:pPr algn="ctr"/>
             <a:r>
-              <a:rPr lang="en-US" sz="1400" dirty="0"/>
+              <a:rPr lang="en-US" sz="1400"/>
               <a:t>Add User Page</a:t>
             </a:r>
           </a:p>
@@ -11569,7 +11637,7 @@
           <a:p>
             <a:pPr algn="ctr"/>
             <a:r>
-              <a:rPr lang="en-US" sz="1400" dirty="0"/>
+              <a:rPr lang="en-US" sz="1400"/>
               <a:t>Removes a selected user from database</a:t>
             </a:r>
           </a:p>
@@ -11703,7 +11771,7 @@
           <a:p>
             <a:pPr algn="ctr"/>
             <a:r>
-              <a:rPr lang="en-US" sz="1400" dirty="0"/>
+              <a:rPr lang="en-US" sz="1400"/>
               <a:t>Select a user to remove or edit their details</a:t>
             </a:r>
           </a:p>
@@ -11837,7 +11905,7 @@
           <a:lstStyle/>
           <a:p>
             <a:r>
-              <a:rPr lang="en-US" sz="3200" b="1" u="sng" dirty="0"/>
+              <a:rPr lang="en-US" sz="3200" b="1" u="sng"/>
               <a:t>USER MANAGEMENT PAGE</a:t>
             </a:r>
           </a:p>
@@ -12068,7 +12136,7 @@
           <a:p>
             <a:pPr algn="ctr"/>
             <a:r>
-              <a:rPr lang="en-US" sz="1400" dirty="0"/>
+              <a:rPr lang="en-US" sz="1400"/>
               <a:t>User Management Page</a:t>
             </a:r>
           </a:p>
@@ -12119,7 +12187,7 @@
           <a:p>
             <a:pPr algn="ctr"/>
             <a:r>
-              <a:rPr lang="en-US" sz="1400" dirty="0"/>
+              <a:rPr lang="en-US" sz="1400"/>
               <a:t>User details saved on database</a:t>
             </a:r>
           </a:p>
@@ -12208,7 +12276,7 @@
           <a:lstStyle/>
           <a:p>
             <a:r>
-              <a:rPr lang="en-US" sz="3200" b="1" u="sng" dirty="0"/>
+              <a:rPr lang="en-US" sz="3200" b="1" u="sng"/>
               <a:t>ADD USER PAGE</a:t>
             </a:r>
           </a:p>
@@ -12394,7 +12462,7 @@
           <a:p>
             <a:pPr algn="ctr"/>
             <a:r>
-              <a:rPr lang="en-US" sz="1400" dirty="0"/>
+              <a:rPr lang="en-US" sz="1400"/>
               <a:t>Select a report to view or print their details</a:t>
             </a:r>
           </a:p>
@@ -12660,7 +12728,7 @@
           <a:p>
             <a:pPr algn="ctr"/>
             <a:r>
-              <a:rPr lang="en-US" sz="1400" dirty="0"/>
+              <a:rPr lang="en-US" sz="1400"/>
               <a:t>Welcome Page</a:t>
             </a:r>
           </a:p>
@@ -12755,7 +12823,7 @@
           <a:p>
             <a:pPr algn="ctr"/>
             <a:r>
-              <a:rPr lang="en-US" sz="1400" dirty="0"/>
+              <a:rPr lang="en-US" sz="1400"/>
               <a:t>Report details is being printed</a:t>
             </a:r>
           </a:p>
@@ -12844,7 +12912,7 @@
           <a:lstStyle/>
           <a:p>
             <a:r>
-              <a:rPr lang="en-US" sz="3200" b="1" u="sng" dirty="0"/>
+              <a:rPr lang="en-US" sz="3200" b="1" u="sng"/>
               <a:t>REPORT PAGE</a:t>
             </a:r>
           </a:p>

</xml_diff>